<commit_message>
update images and dataset
</commit_message>
<xml_diff>
--- a/images/editing_images.pptx
+++ b/images/editing_images.pptx
@@ -8,6 +8,7 @@
     <p:sldId id="256" r:id="rId2"/>
     <p:sldId id="257" r:id="rId3"/>
     <p:sldId id="258" r:id="rId4"/>
+    <p:sldId id="259" r:id="rId5"/>
   </p:sldIdLst>
   <p:sldSz cx="12192000" cy="6858000"/>
   <p:notesSz cx="6858000" cy="9144000"/>
@@ -106,6 +107,11 @@
       </a:defRPr>
     </a:lvl9pPr>
   </p:defaultTextStyle>
+  <p:extLst>
+    <p:ext uri="{EFAFB233-063F-42B5-8137-9DF3F51BA10A}">
+      <p15:sldGuideLst xmlns:p15="http://schemas.microsoft.com/office/powerpoint/2012/main"/>
+    </p:ext>
+  </p:extLst>
 </p:presentation>
 </file>
 
@@ -139,6 +145,126 @@
 </inkml:ink>
 </file>
 
+<file path=ppt/ink/ink2.xml><?xml version="1.0" encoding="utf-8"?>
+<inkml:ink xmlns:inkml="http://www.w3.org/2003/InkML">
+  <inkml:definitions>
+    <inkml:context xml:id="ctx0">
+      <inkml:inkSource xml:id="inkSrc0">
+        <inkml:traceFormat>
+          <inkml:channel name="X" type="integer" min="-2.14748E9" max="2.14748E9" units="cm"/>
+          <inkml:channel name="Y" type="integer" min="-2.14748E9" max="2.14748E9" units="cm"/>
+          <inkml:channel name="F" type="integer" max="32767" units="dev"/>
+        </inkml:traceFormat>
+        <inkml:channelProperties>
+          <inkml:channelProperty channel="X" name="resolution" value="1000" units="1/cm"/>
+          <inkml:channelProperty channel="Y" name="resolution" value="1000" units="1/cm"/>
+          <inkml:channelProperty channel="F" name="resolution" value="0" units="1/dev"/>
+        </inkml:channelProperties>
+      </inkml:inkSource>
+      <inkml:timestamp xml:id="ts0" timeString="2022-05-02T21:08:06.285"/>
+    </inkml:context>
+    <inkml:brush xml:id="br0">
+      <inkml:brushProperty name="width" value="0.3" units="cm"/>
+      <inkml:brushProperty name="height" value="0.6" units="cm"/>
+      <inkml:brushProperty name="color" value="#FFFC00"/>
+      <inkml:brushProperty name="tip" value="rectangle"/>
+      <inkml:brushProperty name="rasterOp" value="maskPen"/>
+    </inkml:brush>
+  </inkml:definitions>
+  <inkml:trace contextRef="#ctx0" brushRef="#br0">1 1 16383,'42'9'0,"-4"-2"0,-22-7 0,0 0 0,0 0 0,0 0 0,0 0 0,0 0 0,0 0 0,0 0 0,0 0 0,0 0 0,0 0 0,0 0 0,0 0 0,0 0 0,0 0 0,4 0 0,-3 0 0,2 0 0,-3 0 0,0 0 0,0 0 0,0 0 0,0 0 0,0 0 0,1 0 0,-1 0 0,0 0 0,0 0 0,0 0 0,14 0 0,-11 0 0,26 0 0,-29 0 0,24 0 0,-25 0 0,19 0 0,-16 0 0,12 0 0,-12 0 0,5 0 0,-7 0 0,0 0 0,0 0 0,0 0 0,4 0 0,-3 0 0,2 0 0,-3 0 0,0 0 0</inkml:trace>
+</inkml:ink>
+</file>
+
+<file path=ppt/ink/ink3.xml><?xml version="1.0" encoding="utf-8"?>
+<inkml:ink xmlns:inkml="http://www.w3.org/2003/InkML">
+  <inkml:definitions>
+    <inkml:context xml:id="ctx0">
+      <inkml:inkSource xml:id="inkSrc0">
+        <inkml:traceFormat>
+          <inkml:channel name="X" type="integer" min="-2.14748E9" max="2.14748E9" units="cm"/>
+          <inkml:channel name="Y" type="integer" min="-2.14748E9" max="2.14748E9" units="cm"/>
+          <inkml:channel name="F" type="integer" max="32767" units="dev"/>
+        </inkml:traceFormat>
+        <inkml:channelProperties>
+          <inkml:channelProperty channel="X" name="resolution" value="1000" units="1/cm"/>
+          <inkml:channelProperty channel="Y" name="resolution" value="1000" units="1/cm"/>
+          <inkml:channelProperty channel="F" name="resolution" value="0" units="1/dev"/>
+        </inkml:channelProperties>
+      </inkml:inkSource>
+      <inkml:timestamp xml:id="ts0" timeString="2022-05-02T21:08:08.103"/>
+    </inkml:context>
+    <inkml:brush xml:id="br0">
+      <inkml:brushProperty name="width" value="0.3" units="cm"/>
+      <inkml:brushProperty name="height" value="0.6" units="cm"/>
+      <inkml:brushProperty name="color" value="#FFFC00"/>
+      <inkml:brushProperty name="tip" value="rectangle"/>
+      <inkml:brushProperty name="rasterOp" value="maskPen"/>
+    </inkml:brush>
+  </inkml:definitions>
+  <inkml:trace contextRef="#ctx0" brushRef="#br0">1 89 16383,'35'-17'0,"-3"6"0,-19 7 0,3 4 0,0 0 0,14-4 0,-10 0 0,17-4 0,-19 3 0,16-2 0,-19 3 0,18-1 0,-19 2 0,9 3 0,-7 0 0,8 0 0,-7 0 0,10-7 0,-10 5 0,10-5 0,-10 7 0,21 0 0,-19 0 0,12 0 0,-15 0 0,-7 0 0,-2 0 0</inkml:trace>
+</inkml:ink>
+</file>
+
+<file path=ppt/ink/ink4.xml><?xml version="1.0" encoding="utf-8"?>
+<inkml:ink xmlns:inkml="http://www.w3.org/2003/InkML">
+  <inkml:definitions>
+    <inkml:context xml:id="ctx0">
+      <inkml:inkSource xml:id="inkSrc0">
+        <inkml:traceFormat>
+          <inkml:channel name="X" type="integer" min="-2.14748E9" max="2.14748E9" units="cm"/>
+          <inkml:channel name="Y" type="integer" min="-2.14748E9" max="2.14748E9" units="cm"/>
+          <inkml:channel name="F" type="integer" max="32767" units="dev"/>
+        </inkml:traceFormat>
+        <inkml:channelProperties>
+          <inkml:channelProperty channel="X" name="resolution" value="1000" units="1/cm"/>
+          <inkml:channelProperty channel="Y" name="resolution" value="1000" units="1/cm"/>
+          <inkml:channelProperty channel="F" name="resolution" value="0" units="1/dev"/>
+        </inkml:channelProperties>
+      </inkml:inkSource>
+      <inkml:timestamp xml:id="ts0" timeString="2022-05-02T21:08:10.133"/>
+    </inkml:context>
+    <inkml:brush xml:id="br0">
+      <inkml:brushProperty name="width" value="0.3" units="cm"/>
+      <inkml:brushProperty name="height" value="0.6" units="cm"/>
+      <inkml:brushProperty name="color" value="#FFFC00"/>
+      <inkml:brushProperty name="tip" value="rectangle"/>
+      <inkml:brushProperty name="rasterOp" value="maskPen"/>
+    </inkml:brush>
+  </inkml:definitions>
+  <inkml:trace contextRef="#ctx0" brushRef="#br0">0 1 16383,'62'0'0,"-5"0"0,-30 0 0,6 0 0,-6 0 0,8 0 0,0 0 0,16 0 0,6 0 0,2 0 0,2 0 0,8 0 0,3 0 0,-4 0 0,-22 0 0,12 0 0,0 0 0,-13 0 0,37 0 0,-54 0 0,16 0 0,-16 0 0,5 0 0,-9 0 0,-15 0 0,-1 0 0</inkml:trace>
+</inkml:ink>
+</file>
+
+<file path=ppt/ink/ink5.xml><?xml version="1.0" encoding="utf-8"?>
+<inkml:ink xmlns:inkml="http://www.w3.org/2003/InkML">
+  <inkml:definitions>
+    <inkml:context xml:id="ctx0">
+      <inkml:inkSource xml:id="inkSrc0">
+        <inkml:traceFormat>
+          <inkml:channel name="X" type="integer" min="-2.14748E9" max="2.14748E9" units="cm"/>
+          <inkml:channel name="Y" type="integer" min="-2.14748E9" max="2.14748E9" units="cm"/>
+          <inkml:channel name="F" type="integer" max="32767" units="dev"/>
+        </inkml:traceFormat>
+        <inkml:channelProperties>
+          <inkml:channelProperty channel="X" name="resolution" value="1000" units="1/cm"/>
+          <inkml:channelProperty channel="Y" name="resolution" value="1000" units="1/cm"/>
+          <inkml:channelProperty channel="F" name="resolution" value="0" units="1/dev"/>
+        </inkml:channelProperties>
+      </inkml:inkSource>
+      <inkml:timestamp xml:id="ts0" timeString="2022-05-02T21:08:13.093"/>
+    </inkml:context>
+    <inkml:brush xml:id="br0">
+      <inkml:brushProperty name="width" value="0.3" units="cm"/>
+      <inkml:brushProperty name="height" value="0.6" units="cm"/>
+      <inkml:brushProperty name="color" value="#FFFC00"/>
+      <inkml:brushProperty name="tip" value="rectangle"/>
+      <inkml:brushProperty name="rasterOp" value="maskPen"/>
+    </inkml:brush>
+  </inkml:definitions>
+  <inkml:trace contextRef="#ctx0" brushRef="#br0">0 9 16383,'54'-5'0,"-8"2"0,-30 3 0,8 0 0,-6 0 0,7 0 0,-9 0 0,0 0 0,0 0 0,14 0 0,-10 0 0,14 0 0,-17 0 0,9 0 0,-8 0 0,12 0 0,-12 0 0,2 0 0,-1 0 0,-6 0 0,6 0 0,-3 0 0,1 0 0,-1 0 0,0 0 0,0 0 0,0 0 0,0 0 0,0 0 0,3 0 0,-2 0 0,3 0 0,-4 0 0,0 0 0,0 0 0,0 0 0,0 0 0,0 0 0,0 0 0,0 0 0,0 0 0,0 0 0,0 0 0,0 0 0,0 0 0,0 0 0,0 0 0,4 0 0,-3 0 0,2 0 0</inkml:trace>
+</inkml:ink>
+</file>
+
 <file path=ppt/slideLayouts/slideLayout1.xml><?xml version="1.0" encoding="utf-8"?>
 <p:sldLayout xmlns:a="http://schemas.openxmlformats.org/drawingml/2006/main" xmlns:r="http://schemas.openxmlformats.org/officeDocument/2006/relationships" xmlns:p="http://schemas.openxmlformats.org/presentationml/2006/main" type="title" preserve="1">
   <p:cSld name="Title Slide">
@@ -286,7 +412,7 @@
           <a:p>
             <a:fld id="{B1E87AC5-B48C-0142-A7FA-9B76E8527604}" type="datetimeFigureOut">
               <a:rPr lang="en-US" smtClean="0"/>
-              <a:t>4/27/22</a:t>
+              <a:t>5/2/22</a:t>
             </a:fld>
             <a:endParaRPr lang="en-US"/>
           </a:p>
@@ -484,7 +610,7 @@
           <a:p>
             <a:fld id="{B1E87AC5-B48C-0142-A7FA-9B76E8527604}" type="datetimeFigureOut">
               <a:rPr lang="en-US" smtClean="0"/>
-              <a:t>4/27/22</a:t>
+              <a:t>5/2/22</a:t>
             </a:fld>
             <a:endParaRPr lang="en-US"/>
           </a:p>
@@ -692,7 +818,7 @@
           <a:p>
             <a:fld id="{B1E87AC5-B48C-0142-A7FA-9B76E8527604}" type="datetimeFigureOut">
               <a:rPr lang="en-US" smtClean="0"/>
-              <a:t>4/27/22</a:t>
+              <a:t>5/2/22</a:t>
             </a:fld>
             <a:endParaRPr lang="en-US"/>
           </a:p>
@@ -890,7 +1016,7 @@
           <a:p>
             <a:fld id="{B1E87AC5-B48C-0142-A7FA-9B76E8527604}" type="datetimeFigureOut">
               <a:rPr lang="en-US" smtClean="0"/>
-              <a:t>4/27/22</a:t>
+              <a:t>5/2/22</a:t>
             </a:fld>
             <a:endParaRPr lang="en-US"/>
           </a:p>
@@ -1165,7 +1291,7 @@
           <a:p>
             <a:fld id="{B1E87AC5-B48C-0142-A7FA-9B76E8527604}" type="datetimeFigureOut">
               <a:rPr lang="en-US" smtClean="0"/>
-              <a:t>4/27/22</a:t>
+              <a:t>5/2/22</a:t>
             </a:fld>
             <a:endParaRPr lang="en-US"/>
           </a:p>
@@ -1430,7 +1556,7 @@
           <a:p>
             <a:fld id="{B1E87AC5-B48C-0142-A7FA-9B76E8527604}" type="datetimeFigureOut">
               <a:rPr lang="en-US" smtClean="0"/>
-              <a:t>4/27/22</a:t>
+              <a:t>5/2/22</a:t>
             </a:fld>
             <a:endParaRPr lang="en-US"/>
           </a:p>
@@ -1842,7 +1968,7 @@
           <a:p>
             <a:fld id="{B1E87AC5-B48C-0142-A7FA-9B76E8527604}" type="datetimeFigureOut">
               <a:rPr lang="en-US" smtClean="0"/>
-              <a:t>4/27/22</a:t>
+              <a:t>5/2/22</a:t>
             </a:fld>
             <a:endParaRPr lang="en-US"/>
           </a:p>
@@ -1983,7 +2109,7 @@
           <a:p>
             <a:fld id="{B1E87AC5-B48C-0142-A7FA-9B76E8527604}" type="datetimeFigureOut">
               <a:rPr lang="en-US" smtClean="0"/>
-              <a:t>4/27/22</a:t>
+              <a:t>5/2/22</a:t>
             </a:fld>
             <a:endParaRPr lang="en-US"/>
           </a:p>
@@ -2096,7 +2222,7 @@
           <a:p>
             <a:fld id="{B1E87AC5-B48C-0142-A7FA-9B76E8527604}" type="datetimeFigureOut">
               <a:rPr lang="en-US" smtClean="0"/>
-              <a:t>4/27/22</a:t>
+              <a:t>5/2/22</a:t>
             </a:fld>
             <a:endParaRPr lang="en-US"/>
           </a:p>
@@ -2407,7 +2533,7 @@
           <a:p>
             <a:fld id="{B1E87AC5-B48C-0142-A7FA-9B76E8527604}" type="datetimeFigureOut">
               <a:rPr lang="en-US" smtClean="0"/>
-              <a:t>4/27/22</a:t>
+              <a:t>5/2/22</a:t>
             </a:fld>
             <a:endParaRPr lang="en-US"/>
           </a:p>
@@ -2695,7 +2821,7 @@
           <a:p>
             <a:fld id="{B1E87AC5-B48C-0142-A7FA-9B76E8527604}" type="datetimeFigureOut">
               <a:rPr lang="en-US" smtClean="0"/>
-              <a:t>4/27/22</a:t>
+              <a:t>5/2/22</a:t>
             </a:fld>
             <a:endParaRPr lang="en-US"/>
           </a:p>
@@ -2936,7 +3062,7 @@
           <a:p>
             <a:fld id="{B1E87AC5-B48C-0142-A7FA-9B76E8527604}" type="datetimeFigureOut">
               <a:rPr lang="en-US" smtClean="0"/>
-              <a:t>4/27/22</a:t>
+              <a:t>5/2/22</a:t>
             </a:fld>
             <a:endParaRPr lang="en-US"/>
           </a:p>
@@ -3948,8 +4074,8 @@
           </a:p>
         </p:txBody>
       </p:sp>
-      <mc:AlternateContent xmlns:mc="http://schemas.openxmlformats.org/markup-compatibility/2006">
-        <mc:Choice xmlns:p14="http://schemas.microsoft.com/office/powerpoint/2010/main" Requires="p14">
+      <mc:AlternateContent xmlns:mc="http://schemas.openxmlformats.org/markup-compatibility/2006" xmlns:p14="http://schemas.microsoft.com/office/powerpoint/2010/main">
+        <mc:Choice Requires="p14">
           <p:contentPart p14:bwMode="auto" r:id="rId3">
             <p14:nvContentPartPr>
               <p14:cNvPr id="5" name="Ink 4">
@@ -3968,7 +4094,7 @@
             </p14:xfrm>
           </p:contentPart>
         </mc:Choice>
-        <mc:Fallback>
+        <mc:Fallback xmlns="">
           <p:pic>
             <p:nvPicPr>
               <p:cNvPr id="5" name="Ink 4">
@@ -4159,6 +4285,546 @@
     <p:extLst>
       <p:ext uri="{BB962C8B-B14F-4D97-AF65-F5344CB8AC3E}">
         <p14:creationId xmlns:p14="http://schemas.microsoft.com/office/powerpoint/2010/main" val="2386301939"/>
+      </p:ext>
+    </p:extLst>
+  </p:cSld>
+  <p:clrMapOvr>
+    <a:masterClrMapping/>
+  </p:clrMapOvr>
+</p:sld>
+</file>
+
+<file path=ppt/slides/slide4.xml><?xml version="1.0" encoding="utf-8"?>
+<p:sld xmlns:a="http://schemas.openxmlformats.org/drawingml/2006/main" xmlns:r="http://schemas.openxmlformats.org/officeDocument/2006/relationships" xmlns:p="http://schemas.openxmlformats.org/presentationml/2006/main">
+  <p:cSld>
+    <p:spTree>
+      <p:nvGrpSpPr>
+        <p:cNvPr id="1" name=""/>
+        <p:cNvGrpSpPr/>
+        <p:nvPr/>
+      </p:nvGrpSpPr>
+      <p:grpSpPr>
+        <a:xfrm>
+          <a:off x="0" y="0"/>
+          <a:ext cx="0" cy="0"/>
+          <a:chOff x="0" y="0"/>
+          <a:chExt cx="0" cy="0"/>
+        </a:xfrm>
+      </p:grpSpPr>
+      <p:pic>
+        <p:nvPicPr>
+          <p:cNvPr id="3" name="Picture 2" descr="Graphical user interface, application, email&#10;&#10;Description automatically generated">
+            <a:extLst>
+              <a:ext uri="{FF2B5EF4-FFF2-40B4-BE49-F238E27FC236}">
+                <a16:creationId xmlns:a16="http://schemas.microsoft.com/office/drawing/2014/main" id="{C28B2EE9-2F9D-284A-F6FB-CF98023149F8}"/>
+              </a:ext>
+            </a:extLst>
+          </p:cNvPr>
+          <p:cNvPicPr>
+            <a:picLocks noChangeAspect="1"/>
+          </p:cNvPicPr>
+          <p:nvPr/>
+        </p:nvPicPr>
+        <p:blipFill>
+          <a:blip r:embed="rId2"/>
+          <a:stretch>
+            <a:fillRect/>
+          </a:stretch>
+        </p:blipFill>
+        <p:spPr>
+          <a:xfrm>
+            <a:off x="3647969" y="0"/>
+            <a:ext cx="4896061" cy="6858000"/>
+          </a:xfrm>
+          <a:prstGeom prst="rect">
+            <a:avLst/>
+          </a:prstGeom>
+        </p:spPr>
+      </p:pic>
+      <mc:AlternateContent xmlns:mc="http://schemas.openxmlformats.org/markup-compatibility/2006">
+        <mc:Choice xmlns:p14="http://schemas.microsoft.com/office/powerpoint/2010/main" Requires="p14">
+          <p:contentPart p14:bwMode="auto" r:id="rId3">
+            <p14:nvContentPartPr>
+              <p14:cNvPr id="4" name="Ink 3">
+                <a:extLst>
+                  <a:ext uri="{FF2B5EF4-FFF2-40B4-BE49-F238E27FC236}">
+                    <a16:creationId xmlns:a16="http://schemas.microsoft.com/office/drawing/2014/main" id="{6ECDFBFB-0520-56A3-05CA-DBD011E6E6D9}"/>
+                  </a:ext>
+                </a:extLst>
+              </p14:cNvPr>
+              <p14:cNvContentPartPr/>
+              <p14:nvPr/>
+            </p14:nvContentPartPr>
+            <p14:xfrm>
+              <a:off x="4095299" y="1229447"/>
+              <a:ext cx="358200" cy="6120"/>
+            </p14:xfrm>
+          </p:contentPart>
+        </mc:Choice>
+        <mc:Fallback>
+          <p:pic>
+            <p:nvPicPr>
+              <p:cNvPr id="4" name="Ink 3">
+                <a:extLst>
+                  <a:ext uri="{FF2B5EF4-FFF2-40B4-BE49-F238E27FC236}">
+                    <a16:creationId xmlns:a16="http://schemas.microsoft.com/office/drawing/2014/main" id="{6ECDFBFB-0520-56A3-05CA-DBD011E6E6D9}"/>
+                  </a:ext>
+                </a:extLst>
+              </p:cNvPr>
+              <p:cNvPicPr/>
+              <p:nvPr/>
+            </p:nvPicPr>
+            <p:blipFill>
+              <a:blip r:embed="rId4"/>
+              <a:stretch>
+                <a:fillRect/>
+              </a:stretch>
+            </p:blipFill>
+            <p:spPr>
+              <a:xfrm>
+                <a:off x="4041659" y="1121807"/>
+                <a:ext cx="465840" cy="221760"/>
+              </a:xfrm>
+              <a:prstGeom prst="rect">
+                <a:avLst/>
+              </a:prstGeom>
+            </p:spPr>
+          </p:pic>
+        </mc:Fallback>
+      </mc:AlternateContent>
+      <mc:AlternateContent xmlns:mc="http://schemas.openxmlformats.org/markup-compatibility/2006">
+        <mc:Choice xmlns:p14="http://schemas.microsoft.com/office/powerpoint/2010/main" Requires="p14">
+          <p:contentPart p14:bwMode="auto" r:id="rId5">
+            <p14:nvContentPartPr>
+              <p14:cNvPr id="5" name="Ink 4">
+                <a:extLst>
+                  <a:ext uri="{FF2B5EF4-FFF2-40B4-BE49-F238E27FC236}">
+                    <a16:creationId xmlns:a16="http://schemas.microsoft.com/office/drawing/2014/main" id="{956326EE-5311-728F-CFF3-A79E95E6A279}"/>
+                  </a:ext>
+                </a:extLst>
+              </p14:cNvPr>
+              <p14:cNvContentPartPr/>
+              <p14:nvPr/>
+            </p14:nvContentPartPr>
+            <p14:xfrm>
+              <a:off x="6330899" y="1210367"/>
+              <a:ext cx="216720" cy="32040"/>
+            </p14:xfrm>
+          </p:contentPart>
+        </mc:Choice>
+        <mc:Fallback>
+          <p:pic>
+            <p:nvPicPr>
+              <p:cNvPr id="5" name="Ink 4">
+                <a:extLst>
+                  <a:ext uri="{FF2B5EF4-FFF2-40B4-BE49-F238E27FC236}">
+                    <a16:creationId xmlns:a16="http://schemas.microsoft.com/office/drawing/2014/main" id="{956326EE-5311-728F-CFF3-A79E95E6A279}"/>
+                  </a:ext>
+                </a:extLst>
+              </p:cNvPr>
+              <p:cNvPicPr/>
+              <p:nvPr/>
+            </p:nvPicPr>
+            <p:blipFill>
+              <a:blip r:embed="rId6"/>
+              <a:stretch>
+                <a:fillRect/>
+              </a:stretch>
+            </p:blipFill>
+            <p:spPr>
+              <a:xfrm>
+                <a:off x="6277259" y="1102727"/>
+                <a:ext cx="324360" cy="247680"/>
+              </a:xfrm>
+              <a:prstGeom prst="rect">
+                <a:avLst/>
+              </a:prstGeom>
+            </p:spPr>
+          </p:pic>
+        </mc:Fallback>
+      </mc:AlternateContent>
+      <mc:AlternateContent xmlns:mc="http://schemas.openxmlformats.org/markup-compatibility/2006">
+        <mc:Choice xmlns:p14="http://schemas.microsoft.com/office/powerpoint/2010/main" Requires="p14">
+          <p:contentPart p14:bwMode="auto" r:id="rId7">
+            <p14:nvContentPartPr>
+              <p14:cNvPr id="6" name="Ink 5">
+                <a:extLst>
+                  <a:ext uri="{FF2B5EF4-FFF2-40B4-BE49-F238E27FC236}">
+                    <a16:creationId xmlns:a16="http://schemas.microsoft.com/office/drawing/2014/main" id="{BDAFD125-1A62-FC38-6FC5-B607B7236136}"/>
+                  </a:ext>
+                </a:extLst>
+              </p14:cNvPr>
+              <p14:cNvContentPartPr/>
+              <p14:nvPr/>
+            </p14:nvContentPartPr>
+            <p14:xfrm>
+              <a:off x="6301739" y="1935767"/>
+              <a:ext cx="423360" cy="360"/>
+            </p14:xfrm>
+          </p:contentPart>
+        </mc:Choice>
+        <mc:Fallback>
+          <p:pic>
+            <p:nvPicPr>
+              <p:cNvPr id="6" name="Ink 5">
+                <a:extLst>
+                  <a:ext uri="{FF2B5EF4-FFF2-40B4-BE49-F238E27FC236}">
+                    <a16:creationId xmlns:a16="http://schemas.microsoft.com/office/drawing/2014/main" id="{BDAFD125-1A62-FC38-6FC5-B607B7236136}"/>
+                  </a:ext>
+                </a:extLst>
+              </p:cNvPr>
+              <p:cNvPicPr/>
+              <p:nvPr/>
+            </p:nvPicPr>
+            <p:blipFill>
+              <a:blip r:embed="rId8"/>
+              <a:stretch>
+                <a:fillRect/>
+              </a:stretch>
+            </p:blipFill>
+            <p:spPr>
+              <a:xfrm>
+                <a:off x="6247739" y="1828127"/>
+                <a:ext cx="531000" cy="216000"/>
+              </a:xfrm>
+              <a:prstGeom prst="rect">
+                <a:avLst/>
+              </a:prstGeom>
+            </p:spPr>
+          </p:pic>
+        </mc:Fallback>
+      </mc:AlternateContent>
+      <mc:AlternateContent xmlns:mc="http://schemas.openxmlformats.org/markup-compatibility/2006">
+        <mc:Choice xmlns:p14="http://schemas.microsoft.com/office/powerpoint/2010/main" Requires="p14">
+          <p:contentPart p14:bwMode="auto" r:id="rId9">
+            <p14:nvContentPartPr>
+              <p14:cNvPr id="7" name="Ink 6">
+                <a:extLst>
+                  <a:ext uri="{FF2B5EF4-FFF2-40B4-BE49-F238E27FC236}">
+                    <a16:creationId xmlns:a16="http://schemas.microsoft.com/office/drawing/2014/main" id="{71936193-F6C2-519D-0CD4-0C7104F43C88}"/>
+                  </a:ext>
+                </a:extLst>
+              </p14:cNvPr>
+              <p14:cNvContentPartPr/>
+              <p14:nvPr/>
+            </p14:nvContentPartPr>
+            <p14:xfrm>
+              <a:off x="4091339" y="5820167"/>
+              <a:ext cx="351720" cy="3240"/>
+            </p14:xfrm>
+          </p:contentPart>
+        </mc:Choice>
+        <mc:Fallback>
+          <p:pic>
+            <p:nvPicPr>
+              <p:cNvPr id="7" name="Ink 6">
+                <a:extLst>
+                  <a:ext uri="{FF2B5EF4-FFF2-40B4-BE49-F238E27FC236}">
+                    <a16:creationId xmlns:a16="http://schemas.microsoft.com/office/drawing/2014/main" id="{71936193-F6C2-519D-0CD4-0C7104F43C88}"/>
+                  </a:ext>
+                </a:extLst>
+              </p:cNvPr>
+              <p:cNvPicPr/>
+              <p:nvPr/>
+            </p:nvPicPr>
+            <p:blipFill>
+              <a:blip r:embed="rId10"/>
+              <a:stretch>
+                <a:fillRect/>
+              </a:stretch>
+            </p:blipFill>
+            <p:spPr>
+              <a:xfrm>
+                <a:off x="4037339" y="5712527"/>
+                <a:ext cx="459360" cy="218880"/>
+              </a:xfrm>
+              <a:prstGeom prst="rect">
+                <a:avLst/>
+              </a:prstGeom>
+            </p:spPr>
+          </p:pic>
+        </mc:Fallback>
+      </mc:AlternateContent>
+      <p:sp>
+        <p:nvSpPr>
+          <p:cNvPr id="8" name="Left Brace 7">
+            <a:extLst>
+              <a:ext uri="{FF2B5EF4-FFF2-40B4-BE49-F238E27FC236}">
+                <a16:creationId xmlns:a16="http://schemas.microsoft.com/office/drawing/2014/main" id="{777E5749-3CED-977B-13AE-506AB3A45D05}"/>
+              </a:ext>
+            </a:extLst>
+          </p:cNvPr>
+          <p:cNvSpPr/>
+          <p:nvPr/>
+        </p:nvSpPr>
+        <p:spPr>
+          <a:xfrm rot="10800000">
+            <a:off x="6033760" y="4281375"/>
+            <a:ext cx="124478" cy="366797"/>
+          </a:xfrm>
+          <a:prstGeom prst="leftBrace">
+            <a:avLst>
+              <a:gd name="adj1" fmla="val 71317"/>
+              <a:gd name="adj2" fmla="val 50000"/>
+            </a:avLst>
+          </a:prstGeom>
+          <a:ln w="28575">
+            <a:solidFill>
+              <a:srgbClr val="FF0000"/>
+            </a:solidFill>
+          </a:ln>
+        </p:spPr>
+        <p:style>
+          <a:lnRef idx="1">
+            <a:schemeClr val="accent1"/>
+          </a:lnRef>
+          <a:fillRef idx="0">
+            <a:schemeClr val="accent1"/>
+          </a:fillRef>
+          <a:effectRef idx="0">
+            <a:schemeClr val="accent1"/>
+          </a:effectRef>
+          <a:fontRef idx="minor">
+            <a:schemeClr val="tx1"/>
+          </a:fontRef>
+        </p:style>
+        <p:txBody>
+          <a:bodyPr rtlCol="0" anchor="ctr"/>
+          <a:lstStyle/>
+          <a:p>
+            <a:pPr algn="ctr"/>
+            <a:endParaRPr lang="en-US"/>
+          </a:p>
+        </p:txBody>
+      </p:sp>
+      <p:sp>
+        <p:nvSpPr>
+          <p:cNvPr id="9" name="TextBox 8">
+            <a:extLst>
+              <a:ext uri="{FF2B5EF4-FFF2-40B4-BE49-F238E27FC236}">
+                <a16:creationId xmlns:a16="http://schemas.microsoft.com/office/drawing/2014/main" id="{0B79C6FA-8615-4D6E-A6B4-C88246194B46}"/>
+              </a:ext>
+            </a:extLst>
+          </p:cNvPr>
+          <p:cNvSpPr txBox="1"/>
+          <p:nvPr/>
+        </p:nvSpPr>
+        <p:spPr>
+          <a:xfrm>
+            <a:off x="6132462" y="4278841"/>
+            <a:ext cx="351378" cy="369332"/>
+          </a:xfrm>
+          <a:prstGeom prst="rect">
+            <a:avLst/>
+          </a:prstGeom>
+          <a:noFill/>
+        </p:spPr>
+        <p:txBody>
+          <a:bodyPr wrap="none" rtlCol="0">
+            <a:spAutoFit/>
+          </a:bodyPr>
+          <a:lstStyle/>
+          <a:p>
+            <a:r>
+              <a:rPr lang="en-US" b="1" dirty="0">
+                <a:solidFill>
+                  <a:srgbClr val="FF0000"/>
+                </a:solidFill>
+                <a:latin typeface="Times" pitchFamily="2" charset="0"/>
+              </a:rPr>
+              <a:t>C</a:t>
+            </a:r>
+          </a:p>
+        </p:txBody>
+      </p:sp>
+      <p:sp>
+        <p:nvSpPr>
+          <p:cNvPr id="10" name="TextBox 9">
+            <a:extLst>
+              <a:ext uri="{FF2B5EF4-FFF2-40B4-BE49-F238E27FC236}">
+                <a16:creationId xmlns:a16="http://schemas.microsoft.com/office/drawing/2014/main" id="{B1771A09-BB08-240A-CA1A-9A75C862A2C0}"/>
+              </a:ext>
+            </a:extLst>
+          </p:cNvPr>
+          <p:cNvSpPr txBox="1"/>
+          <p:nvPr/>
+        </p:nvSpPr>
+        <p:spPr>
+          <a:xfrm>
+            <a:off x="5864482" y="1376152"/>
+            <a:ext cx="351378" cy="369332"/>
+          </a:xfrm>
+          <a:prstGeom prst="rect">
+            <a:avLst/>
+          </a:prstGeom>
+          <a:noFill/>
+        </p:spPr>
+        <p:txBody>
+          <a:bodyPr wrap="none" rtlCol="0">
+            <a:spAutoFit/>
+          </a:bodyPr>
+          <a:lstStyle/>
+          <a:p>
+            <a:r>
+              <a:rPr lang="en-US" b="1" dirty="0">
+                <a:solidFill>
+                  <a:srgbClr val="FF0000"/>
+                </a:solidFill>
+                <a:latin typeface="Times" pitchFamily="2" charset="0"/>
+              </a:rPr>
+              <a:t>A</a:t>
+            </a:r>
+          </a:p>
+        </p:txBody>
+      </p:sp>
+      <p:sp>
+        <p:nvSpPr>
+          <p:cNvPr id="11" name="Oval 10">
+            <a:extLst>
+              <a:ext uri="{FF2B5EF4-FFF2-40B4-BE49-F238E27FC236}">
+                <a16:creationId xmlns:a16="http://schemas.microsoft.com/office/drawing/2014/main" id="{4771C7A5-D4AB-5733-7FA1-7F5391CD5A61}"/>
+              </a:ext>
+            </a:extLst>
+          </p:cNvPr>
+          <p:cNvSpPr/>
+          <p:nvPr/>
+        </p:nvSpPr>
+        <p:spPr>
+          <a:xfrm>
+            <a:off x="6203036" y="1345447"/>
+            <a:ext cx="2281596" cy="430741"/>
+          </a:xfrm>
+          <a:prstGeom prst="ellipse">
+            <a:avLst/>
+          </a:prstGeom>
+          <a:noFill/>
+          <a:ln w="38100">
+            <a:solidFill>
+              <a:srgbClr val="FF0000"/>
+            </a:solidFill>
+          </a:ln>
+        </p:spPr>
+        <p:style>
+          <a:lnRef idx="2">
+            <a:schemeClr val="accent1">
+              <a:shade val="50000"/>
+            </a:schemeClr>
+          </a:lnRef>
+          <a:fillRef idx="1">
+            <a:schemeClr val="accent1"/>
+          </a:fillRef>
+          <a:effectRef idx="0">
+            <a:schemeClr val="accent1"/>
+          </a:effectRef>
+          <a:fontRef idx="minor">
+            <a:schemeClr val="lt1"/>
+          </a:fontRef>
+        </p:style>
+        <p:txBody>
+          <a:bodyPr rtlCol="0" anchor="ctr"/>
+          <a:lstStyle/>
+          <a:p>
+            <a:pPr algn="ctr"/>
+            <a:endParaRPr lang="en-US"/>
+          </a:p>
+        </p:txBody>
+      </p:sp>
+      <p:sp>
+        <p:nvSpPr>
+          <p:cNvPr id="12" name="Oval 11">
+            <a:extLst>
+              <a:ext uri="{FF2B5EF4-FFF2-40B4-BE49-F238E27FC236}">
+                <a16:creationId xmlns:a16="http://schemas.microsoft.com/office/drawing/2014/main" id="{BFBF6921-2024-71B4-9267-74506A3CBED6}"/>
+              </a:ext>
+            </a:extLst>
+          </p:cNvPr>
+          <p:cNvSpPr/>
+          <p:nvPr/>
+        </p:nvSpPr>
+        <p:spPr>
+          <a:xfrm>
+            <a:off x="6203036" y="1901135"/>
+            <a:ext cx="2281596" cy="430741"/>
+          </a:xfrm>
+          <a:prstGeom prst="ellipse">
+            <a:avLst/>
+          </a:prstGeom>
+          <a:noFill/>
+          <a:ln w="38100">
+            <a:solidFill>
+              <a:srgbClr val="FF0000"/>
+            </a:solidFill>
+          </a:ln>
+        </p:spPr>
+        <p:style>
+          <a:lnRef idx="2">
+            <a:schemeClr val="accent1">
+              <a:shade val="50000"/>
+            </a:schemeClr>
+          </a:lnRef>
+          <a:fillRef idx="1">
+            <a:schemeClr val="accent1"/>
+          </a:fillRef>
+          <a:effectRef idx="0">
+            <a:schemeClr val="accent1"/>
+          </a:effectRef>
+          <a:fontRef idx="minor">
+            <a:schemeClr val="lt1"/>
+          </a:fontRef>
+        </p:style>
+        <p:txBody>
+          <a:bodyPr rtlCol="0" anchor="ctr"/>
+          <a:lstStyle/>
+          <a:p>
+            <a:pPr algn="ctr"/>
+            <a:endParaRPr lang="en-US"/>
+          </a:p>
+        </p:txBody>
+      </p:sp>
+      <p:sp>
+        <p:nvSpPr>
+          <p:cNvPr id="13" name="TextBox 12">
+            <a:extLst>
+              <a:ext uri="{FF2B5EF4-FFF2-40B4-BE49-F238E27FC236}">
+                <a16:creationId xmlns:a16="http://schemas.microsoft.com/office/drawing/2014/main" id="{F1758219-9BBC-68CF-C546-5E5378D57A41}"/>
+              </a:ext>
+            </a:extLst>
+          </p:cNvPr>
+          <p:cNvSpPr txBox="1"/>
+          <p:nvPr/>
+        </p:nvSpPr>
+        <p:spPr>
+          <a:xfrm>
+            <a:off x="5862390" y="1956265"/>
+            <a:ext cx="338554" cy="369332"/>
+          </a:xfrm>
+          <a:prstGeom prst="rect">
+            <a:avLst/>
+          </a:prstGeom>
+          <a:noFill/>
+        </p:spPr>
+        <p:txBody>
+          <a:bodyPr wrap="none" rtlCol="0">
+            <a:spAutoFit/>
+          </a:bodyPr>
+          <a:lstStyle/>
+          <a:p>
+            <a:r>
+              <a:rPr lang="en-US" b="1" dirty="0">
+                <a:solidFill>
+                  <a:srgbClr val="FF0000"/>
+                </a:solidFill>
+                <a:latin typeface="Times" pitchFamily="2" charset="0"/>
+              </a:rPr>
+              <a:t>B</a:t>
+            </a:r>
+          </a:p>
+        </p:txBody>
+      </p:sp>
+    </p:spTree>
+    <p:extLst>
+      <p:ext uri="{BB962C8B-B14F-4D97-AF65-F5344CB8AC3E}">
+        <p14:creationId xmlns:p14="http://schemas.microsoft.com/office/powerpoint/2010/main" val="2571363693"/>
       </p:ext>
     </p:extLst>
   </p:cSld>

</xml_diff>